<commit_message>
Update Comparison of Quantum & Classical Deep Learning poster.pptx
</commit_message>
<xml_diff>
--- a/poster/Comparison of Quantum & Classical Deep Learning poster.pptx
+++ b/poster/Comparison of Quantum & Classical Deep Learning poster.pptx
@@ -171,8 +171,7 @@
 <file path=ppt/revisionInfo.xml><?xml version="1.0" encoding="utf-8"?>
 <p1510:revInfo xmlns:a="http://schemas.openxmlformats.org/drawingml/2006/main" xmlns:r="http://schemas.openxmlformats.org/officeDocument/2006/relationships" xmlns:p1510="http://schemas.microsoft.com/office/powerpoint/2015/10/main">
   <p1510:revLst>
-    <p1510:client id="{48655D1F-B9AB-404D-9736-F95ED151AEC8}" v="185" dt="2024-03-25T16:28:36.822"/>
-    <p1510:client id="{F3690732-3A30-4EB9-AD9B-2E78769DA029}" v="18" dt="2024-03-25T16:59:08.533"/>
+    <p1510:client id="{F3690732-3A30-4EB9-AD9B-2E78769DA029}" v="36" dt="2024-03-31T04:07:58.263"/>
   </p1510:revLst>
 </p1510:revInfo>
 </file>
@@ -182,16 +181,24 @@
   <pc:docChgLst>
     <pc:chgData name="Thelasingha Hitihami Mudiyanselage, Neelanga Chandrajith Thelasingha" userId="d67debf7-c2da-461c-8d10-ba9189376f96" providerId="ADAL" clId="{F3690732-3A30-4EB9-AD9B-2E78769DA029}"/>
     <pc:docChg chg="undo custSel modSld">
-      <pc:chgData name="Thelasingha Hitihami Mudiyanselage, Neelanga Chandrajith Thelasingha" userId="d67debf7-c2da-461c-8d10-ba9189376f96" providerId="ADAL" clId="{F3690732-3A30-4EB9-AD9B-2E78769DA029}" dt="2024-03-25T17:00:30.474" v="73" actId="20577"/>
+      <pc:chgData name="Thelasingha Hitihami Mudiyanselage, Neelanga Chandrajith Thelasingha" userId="d67debf7-c2da-461c-8d10-ba9189376f96" providerId="ADAL" clId="{F3690732-3A30-4EB9-AD9B-2E78769DA029}" dt="2024-03-31T04:29:29.512" v="201" actId="20577"/>
       <pc:docMkLst>
         <pc:docMk/>
       </pc:docMkLst>
       <pc:sldChg chg="addSp delSp modSp mod">
-        <pc:chgData name="Thelasingha Hitihami Mudiyanselage, Neelanga Chandrajith Thelasingha" userId="d67debf7-c2da-461c-8d10-ba9189376f96" providerId="ADAL" clId="{F3690732-3A30-4EB9-AD9B-2E78769DA029}" dt="2024-03-25T17:00:30.474" v="73" actId="20577"/>
+        <pc:chgData name="Thelasingha Hitihami Mudiyanselage, Neelanga Chandrajith Thelasingha" userId="d67debf7-c2da-461c-8d10-ba9189376f96" providerId="ADAL" clId="{F3690732-3A30-4EB9-AD9B-2E78769DA029}" dt="2024-03-31T04:29:29.512" v="201" actId="20577"/>
         <pc:sldMkLst>
           <pc:docMk/>
           <pc:sldMk cId="2402159673" sldId="257"/>
         </pc:sldMkLst>
+        <pc:spChg chg="mod">
+          <ac:chgData name="Thelasingha Hitihami Mudiyanselage, Neelanga Chandrajith Thelasingha" userId="d67debf7-c2da-461c-8d10-ba9189376f96" providerId="ADAL" clId="{F3690732-3A30-4EB9-AD9B-2E78769DA029}" dt="2024-03-31T04:29:29.512" v="201" actId="20577"/>
+          <ac:spMkLst>
+            <pc:docMk/>
+            <pc:sldMk cId="2402159673" sldId="257"/>
+            <ac:spMk id="2" creationId="{00000000-0000-0000-0000-000000000000}"/>
+          </ac:spMkLst>
+        </pc:spChg>
         <pc:spChg chg="del mod">
           <ac:chgData name="Thelasingha Hitihami Mudiyanselage, Neelanga Chandrajith Thelasingha" userId="d67debf7-c2da-461c-8d10-ba9189376f96" providerId="ADAL" clId="{F3690732-3A30-4EB9-AD9B-2E78769DA029}" dt="2024-03-25T16:57:44.934" v="56" actId="478"/>
           <ac:spMkLst>
@@ -209,7 +216,7 @@
           </ac:spMkLst>
         </pc:spChg>
         <pc:spChg chg="mod">
-          <ac:chgData name="Thelasingha Hitihami Mudiyanselage, Neelanga Chandrajith Thelasingha" userId="d67debf7-c2da-461c-8d10-ba9189376f96" providerId="ADAL" clId="{F3690732-3A30-4EB9-AD9B-2E78769DA029}" dt="2024-03-25T17:00:30.474" v="73" actId="20577"/>
+          <ac:chgData name="Thelasingha Hitihami Mudiyanselage, Neelanga Chandrajith Thelasingha" userId="d67debf7-c2da-461c-8d10-ba9189376f96" providerId="ADAL" clId="{F3690732-3A30-4EB9-AD9B-2E78769DA029}" dt="2024-03-31T04:13:30.333" v="194" actId="20577"/>
           <ac:spMkLst>
             <pc:docMk/>
             <pc:sldMk cId="2402159673" sldId="257"/>
@@ -232,8 +239,8 @@
             <ac:picMk id="76" creationId="{484792E5-0965-E942-B24B-339EE90BBC34}"/>
           </ac:picMkLst>
         </pc:picChg>
-        <pc:picChg chg="mod">
-          <ac:chgData name="Thelasingha Hitihami Mudiyanselage, Neelanga Chandrajith Thelasingha" userId="d67debf7-c2da-461c-8d10-ba9189376f96" providerId="ADAL" clId="{F3690732-3A30-4EB9-AD9B-2E78769DA029}" dt="2024-03-25T16:58:38.948" v="65" actId="14100"/>
+        <pc:picChg chg="del mod">
+          <ac:chgData name="Thelasingha Hitihami Mudiyanselage, Neelanga Chandrajith Thelasingha" userId="d67debf7-c2da-461c-8d10-ba9189376f96" providerId="ADAL" clId="{F3690732-3A30-4EB9-AD9B-2E78769DA029}" dt="2024-03-31T04:02:44.467" v="74" actId="478"/>
           <ac:picMkLst>
             <pc:docMk/>
             <pc:sldMk cId="2402159673" sldId="257"/>
@@ -248,6 +255,14 @@
             <ac:picMk id="93" creationId="{7715C4CA-5F86-7346-B3B9-FCA3E1001769}"/>
           </ac:picMkLst>
         </pc:picChg>
+        <pc:picChg chg="add mod">
+          <ac:chgData name="Thelasingha Hitihami Mudiyanselage, Neelanga Chandrajith Thelasingha" userId="d67debf7-c2da-461c-8d10-ba9189376f96" providerId="ADAL" clId="{F3690732-3A30-4EB9-AD9B-2E78769DA029}" dt="2024-03-31T04:07:42.238" v="86" actId="1036"/>
+          <ac:picMkLst>
+            <pc:docMk/>
+            <pc:sldMk cId="2402159673" sldId="257"/>
+            <ac:picMk id="1026" creationId="{360766C2-B4F6-410E-496F-E09D572053F1}"/>
+          </ac:picMkLst>
+        </pc:picChg>
         <pc:picChg chg="add del mod">
           <ac:chgData name="Thelasingha Hitihami Mudiyanselage, Neelanga Chandrajith Thelasingha" userId="d67debf7-c2da-461c-8d10-ba9189376f96" providerId="ADAL" clId="{F3690732-3A30-4EB9-AD9B-2E78769DA029}" dt="2024-03-25T16:57:15.942" v="48" actId="478"/>
           <ac:picMkLst>
@@ -257,7 +272,7 @@
           </ac:picMkLst>
         </pc:picChg>
         <pc:picChg chg="add mod">
-          <ac:chgData name="Thelasingha Hitihami Mudiyanselage, Neelanga Chandrajith Thelasingha" userId="d67debf7-c2da-461c-8d10-ba9189376f96" providerId="ADAL" clId="{F3690732-3A30-4EB9-AD9B-2E78769DA029}" dt="2024-03-25T16:59:08.533" v="69" actId="1076"/>
+          <ac:chgData name="Thelasingha Hitihami Mudiyanselage, Neelanga Chandrajith Thelasingha" userId="d67debf7-c2da-461c-8d10-ba9189376f96" providerId="ADAL" clId="{F3690732-3A30-4EB9-AD9B-2E78769DA029}" dt="2024-03-31T04:07:58.263" v="92" actId="1036"/>
           <ac:picMkLst>
             <pc:docMk/>
             <pc:sldMk cId="2402159673" sldId="257"/>
@@ -5197,7 +5212,7 @@
             <a:off x="613750" y="3856037"/>
             <a:ext cx="30199943" cy="18773094"/>
             <a:chOff x="576544" y="12632086"/>
-            <a:chExt cx="38460450" cy="31368758"/>
+            <a:chExt cx="38460450" cy="31368757"/>
           </a:xfrm>
         </p:grpSpPr>
         <p:sp>
@@ -5209,7 +5224,7 @@
           <p:spPr>
             <a:xfrm>
               <a:off x="581844" y="14018500"/>
-              <a:ext cx="12163244" cy="29982344"/>
+              <a:ext cx="12163243" cy="29982343"/>
             </a:xfrm>
             <a:prstGeom prst="rect">
               <a:avLst/>
@@ -5415,7 +5430,31 @@
                   <a:latin typeface="Arial" panose="020B0604020202020204" pitchFamily="34" charset="0"/>
                   <a:cs typeface="Arial" panose="020B0604020202020204" pitchFamily="34" charset="0"/>
                 </a:rPr>
-                <a:t>of a failure occurring given the presence of a hazard. By comprehensively modeling these vulnerabilities, we gain valuable insights into how the influence of hazards propagates through the infrastructure, potentially setting off a cascade of failures. In this work, we describe the methodology employed, present the results of our risk models, and compare them against state-of-the-art methods like decision trees and neural networks.</a:t>
+                <a:t>of a failure occurring given the presence of a hazard. By comprehensively modeling these vulnerabilities, we gain valuable insights into how the influence of hazards propagates through the infrastructure, potentially setting off a cascade of failures. In this work, we describe the methodology employed, present the results of our risk models, and </a:t>
+              </a:r>
+              <a:r>
+                <a:rPr lang="en-US" sz="2900">
+                  <a:latin typeface="Arial" panose="020B0604020202020204" pitchFamily="34" charset="0"/>
+                  <a:cs typeface="Arial" panose="020B0604020202020204" pitchFamily="34" charset="0"/>
+                </a:rPr>
+                <a:t>compare results using </a:t>
+              </a:r>
+              <a:r>
+                <a:rPr lang="en-US" sz="2900" b="1" dirty="0">
+                  <a:solidFill>
+                    <a:srgbClr val="FF0000"/>
+                  </a:solidFill>
+                  <a:latin typeface="Arial" panose="020B0604020202020204" pitchFamily="34" charset="0"/>
+                  <a:cs typeface="Arial" panose="020B0604020202020204" pitchFamily="34" charset="0"/>
+                </a:rPr>
+                <a:t>classical and quantum neural networks</a:t>
+              </a:r>
+              <a:r>
+                <a:rPr lang="en-US" sz="2900" dirty="0">
+                  <a:latin typeface="Arial" panose="020B0604020202020204" pitchFamily="34" charset="0"/>
+                  <a:cs typeface="Arial" panose="020B0604020202020204" pitchFamily="34" charset="0"/>
+                </a:rPr>
+                <a:t>.</a:t>
               </a:r>
             </a:p>
           </p:txBody>
@@ -6138,36 +6177,6 @@
           </a:p>
         </p:txBody>
       </p:sp>
-      <p:pic>
-        <p:nvPicPr>
-          <p:cNvPr id="77" name="Picture 76">
-            <a:extLst>
-              <a:ext uri="{FF2B5EF4-FFF2-40B4-BE49-F238E27FC236}">
-                <a16:creationId xmlns:a16="http://schemas.microsoft.com/office/drawing/2014/main" id="{4AA0CC0F-F595-7A48-AF5B-EB22DBBCEC89}"/>
-              </a:ext>
-            </a:extLst>
-          </p:cNvPr>
-          <p:cNvPicPr>
-            <a:picLocks noChangeAspect="1"/>
-          </p:cNvPicPr>
-          <p:nvPr/>
-        </p:nvPicPr>
-        <p:blipFill>
-          <a:blip r:embed="rId10"/>
-          <a:stretch>
-            <a:fillRect/>
-          </a:stretch>
-        </p:blipFill>
-        <p:spPr>
-          <a:xfrm>
-            <a:off x="26824262" y="610326"/>
-            <a:ext cx="3936811" cy="1118412"/>
-          </a:xfrm>
-          <a:prstGeom prst="rect">
-            <a:avLst/>
-          </a:prstGeom>
-        </p:spPr>
-      </p:pic>
       <p:sp>
         <p:nvSpPr>
           <p:cNvPr id="15362" name="Rectangle 2"/>
@@ -6272,31 +6281,7 @@
                 <a:cs typeface="Arial Black" pitchFamily="-108" charset="0"/>
                 <a:sym typeface="Arial Black" pitchFamily="-108" charset="0"/>
               </a:rPr>
-              <a:t>eelanga Thelasingha, </a:t>
-            </a:r>
-            <a:r>
-              <a:rPr lang="en-US" sz="3600" dirty="0" err="1">
-                <a:solidFill>
-                  <a:srgbClr val="333399"/>
-                </a:solidFill>
-                <a:latin typeface="Arial Black" pitchFamily="-108" charset="0"/>
-                <a:ea typeface="Arial Black" pitchFamily="-108" charset="0"/>
-                <a:cs typeface="Arial Black" pitchFamily="-108" charset="0"/>
-                <a:sym typeface="Arial Black" pitchFamily="-108" charset="0"/>
-              </a:rPr>
-              <a:t>Thilanka</a:t>
-            </a:r>
-            <a:r>
-              <a:rPr lang="en-US" sz="3600" dirty="0">
-                <a:solidFill>
-                  <a:srgbClr val="333399"/>
-                </a:solidFill>
-                <a:latin typeface="Arial Black" pitchFamily="-108" charset="0"/>
-                <a:ea typeface="Arial Black" pitchFamily="-108" charset="0"/>
-                <a:cs typeface="Arial Black" pitchFamily="-108" charset="0"/>
-                <a:sym typeface="Arial Black" pitchFamily="-108" charset="0"/>
-              </a:rPr>
-              <a:t> </a:t>
+              <a:t>eelanga Thelasingha (ECSE) , Thilanka </a:t>
             </a:r>
             <a:r>
               <a:rPr lang="en-US" sz="3600" dirty="0" err="1">
@@ -6310,15 +6295,18 @@
               </a:rPr>
               <a:t>Munasingha</a:t>
             </a:r>
-            <a:endParaRPr lang="en-US" sz="3600" dirty="0">
-              <a:solidFill>
-                <a:srgbClr val="333399"/>
-              </a:solidFill>
-              <a:latin typeface="Arial Black" pitchFamily="-108" charset="0"/>
-              <a:ea typeface="Arial Black" pitchFamily="-108" charset="0"/>
-              <a:cs typeface="Arial Black" pitchFamily="-108" charset="0"/>
-              <a:sym typeface="Arial Black" pitchFamily="-108" charset="0"/>
-            </a:endParaRPr>
+            <a:r>
+              <a:rPr lang="en-US" sz="3600" dirty="0">
+                <a:solidFill>
+                  <a:srgbClr val="333399"/>
+                </a:solidFill>
+                <a:latin typeface="Arial Black" pitchFamily="-108" charset="0"/>
+                <a:ea typeface="Arial Black" pitchFamily="-108" charset="0"/>
+                <a:cs typeface="Arial Black" pitchFamily="-108" charset="0"/>
+                <a:sym typeface="Arial Black" pitchFamily="-108" charset="0"/>
+              </a:rPr>
+              <a:t> (ITWS)</a:t>
+            </a:r>
           </a:p>
           <a:p>
             <a:pPr marL="17574" algn="ctr">
@@ -6347,7 +6335,7 @@
                 <a:ea typeface="Arial Black" pitchFamily="-108" charset="0"/>
                 <a:cs typeface="Arial Black" pitchFamily="-108" charset="0"/>
                 <a:sym typeface="Arial Black" pitchFamily="-108" charset="0"/>
-                <a:hlinkClick r:id="rId11"/>
+                <a:hlinkClick r:id="rId10"/>
               </a:rPr>
               <a:t>thelan@rpi.edu</a:t>
             </a:r>
@@ -6372,7 +6360,7 @@
                 <a:ea typeface="Arial Black" pitchFamily="-108" charset="0"/>
                 <a:cs typeface="Arial Black" pitchFamily="-108" charset="0"/>
                 <a:sym typeface="Arial Black" pitchFamily="-108" charset="0"/>
-                <a:hlinkClick r:id="rId12"/>
+                <a:hlinkClick r:id="rId11"/>
               </a:rPr>
               <a:t>munast@rpi.edu</a:t>
             </a:r>
@@ -7388,7 +7376,7 @@
                 <a:ea typeface="Verdana" pitchFamily="-108" charset="0"/>
                 <a:cs typeface="Verdana" pitchFamily="-108" charset="0"/>
                 <a:sym typeface="Verdana" pitchFamily="-108" charset="0"/>
-                <a:hlinkClick r:id="rId13"/>
+                <a:hlinkClick r:id="rId12"/>
               </a:rPr>
               <a:t>https://scikit-learn.org/stable/</a:t>
             </a:r>
@@ -7575,7 +7563,7 @@
                 </a:solidFill>
                 <a:latin typeface="Verdana" pitchFamily="-108" charset="0"/>
                 <a:ea typeface="Verdana" pitchFamily="-108" charset="0"/>
-                <a:hlinkClick r:id="rId14"/>
+                <a:hlinkClick r:id="rId13"/>
               </a:rPr>
               <a:t>https://power.larc.nasa.gov/</a:t>
             </a:r>
@@ -7596,7 +7584,7 @@
                 </a:solidFill>
                 <a:latin typeface="Verdana" pitchFamily="-108" charset="0"/>
                 <a:ea typeface="Verdana" pitchFamily="-108" charset="0"/>
-                <a:hlinkClick r:id="rId15"/>
+                <a:hlinkClick r:id="rId14"/>
               </a:rPr>
               <a:t>https://www.oe.netl.doe.gov/oe417.aspx</a:t>
             </a:r>
@@ -7908,7 +7896,7 @@
               <p:nvPr/>
             </p:nvPicPr>
             <p:blipFill>
-              <a:blip r:embed="rId16"/>
+              <a:blip r:embed="rId15"/>
               <a:stretch>
                 <a:fillRect/>
               </a:stretch>
@@ -8470,7 +8458,7 @@
             <p:nvPr/>
           </p:nvPicPr>
           <p:blipFill>
-            <a:blip r:embed="rId17"/>
+            <a:blip r:embed="rId16"/>
             <a:stretch>
               <a:fillRect/>
             </a:stretch>
@@ -8500,7 +8488,7 @@
             <p:nvPr/>
           </p:nvPicPr>
           <p:blipFill>
-            <a:blip r:embed="rId18"/>
+            <a:blip r:embed="rId17"/>
             <a:stretch>
               <a:fillRect/>
             </a:stretch>
@@ -8661,7 +8649,7 @@
           <p:nvPr/>
         </p:nvPicPr>
         <p:blipFill rotWithShape="1">
-          <a:blip r:embed="rId19"/>
+          <a:blip r:embed="rId18"/>
           <a:srcRect b="5220"/>
           <a:stretch/>
         </p:blipFill>
@@ -8690,7 +8678,7 @@
           <p:nvPr/>
         </p:nvPicPr>
         <p:blipFill rotWithShape="1">
-          <a:blip r:embed="rId20"/>
+          <a:blip r:embed="rId19"/>
           <a:srcRect t="10335"/>
           <a:stretch/>
         </p:blipFill>
@@ -8719,7 +8707,7 @@
           <p:nvPr/>
         </p:nvPicPr>
         <p:blipFill rotWithShape="1">
-          <a:blip r:embed="rId21"/>
+          <a:blip r:embed="rId20"/>
           <a:srcRect b="3195"/>
           <a:stretch/>
         </p:blipFill>
@@ -8748,7 +8736,7 @@
           <p:nvPr/>
         </p:nvPicPr>
         <p:blipFill>
-          <a:blip r:embed="rId22"/>
+          <a:blip r:embed="rId21"/>
           <a:stretch>
             <a:fillRect/>
           </a:stretch>
@@ -8798,7 +8786,7 @@
             <p:nvPr/>
           </p:nvPicPr>
           <p:blipFill>
-            <a:blip r:embed="rId23"/>
+            <a:blip r:embed="rId22"/>
             <a:stretch>
               <a:fillRect/>
             </a:stretch>
@@ -8919,7 +8907,7 @@
             <p:nvPr/>
           </p:nvPicPr>
           <p:blipFill>
-            <a:blip r:embed="rId24"/>
+            <a:blip r:embed="rId23"/>
             <a:stretch>
               <a:fillRect/>
             </a:stretch>
@@ -9644,7 +9632,7 @@
           <p:nvPr/>
         </p:nvPicPr>
         <p:blipFill>
-          <a:blip r:embed="rId25"/>
+          <a:blip r:embed="rId24"/>
           <a:stretch>
             <a:fillRect/>
           </a:stretch>
@@ -9855,7 +9843,7 @@
           <p:nvPr/>
         </p:nvPicPr>
         <p:blipFill>
-          <a:blip r:embed="rId26"/>
+          <a:blip r:embed="rId25"/>
           <a:stretch>
             <a:fillRect/>
           </a:stretch>
@@ -9968,7 +9956,7 @@
           <p:nvPr/>
         </p:nvPicPr>
         <p:blipFill>
-          <a:blip r:embed="rId27"/>
+          <a:blip r:embed="rId26"/>
           <a:stretch>
             <a:fillRect/>
           </a:stretch>
@@ -10003,7 +9991,7 @@
           <p:nvPr/>
         </p:nvPicPr>
         <p:blipFill>
-          <a:blip r:embed="rId28"/>
+          <a:blip r:embed="rId27"/>
           <a:stretch>
             <a:fillRect/>
           </a:stretch>
@@ -10058,7 +10046,7 @@
             <p:nvPr/>
           </p:nvPicPr>
           <p:blipFill rotWithShape="1">
-            <a:blip r:embed="rId29"/>
+            <a:blip r:embed="rId28"/>
             <a:srcRect r="18490"/>
             <a:stretch/>
           </p:blipFill>
@@ -10087,7 +10075,7 @@
             <p:nvPr/>
           </p:nvPicPr>
           <p:blipFill rotWithShape="1">
-            <a:blip r:embed="rId30"/>
+            <a:blip r:embed="rId29"/>
             <a:srcRect r="15856"/>
             <a:stretch/>
           </p:blipFill>
@@ -10188,7 +10176,7 @@
             <p:nvPr/>
           </p:nvPicPr>
           <p:blipFill rotWithShape="1">
-            <a:blip r:embed="rId31"/>
+            <a:blip r:embed="rId30"/>
             <a:srcRect r="15528"/>
             <a:stretch/>
           </p:blipFill>
@@ -10364,7 +10352,7 @@
             <p:nvPr/>
           </p:nvPicPr>
           <p:blipFill rotWithShape="1">
-            <a:blip r:embed="rId32"/>
+            <a:blip r:embed="rId31"/>
             <a:srcRect t="62522"/>
             <a:stretch/>
           </p:blipFill>
@@ -10393,7 +10381,7 @@
             <p:nvPr/>
           </p:nvPicPr>
           <p:blipFill rotWithShape="1">
-            <a:blip r:embed="rId32"/>
+            <a:blip r:embed="rId31"/>
             <a:srcRect b="55083"/>
             <a:stretch/>
           </p:blipFill>
@@ -10778,7 +10766,7 @@
             <p:nvPr/>
           </p:nvPicPr>
           <p:blipFill>
-            <a:blip r:embed="rId33">
+            <a:blip r:embed="rId32">
               <a:extLst>
                 <a:ext uri="{28A0092B-C50C-407E-A947-70E740481C1C}">
                   <a14:useLocalDpi xmlns:a14="http://schemas.microsoft.com/office/drawing/2010/main" val="0"/>
@@ -10825,7 +10813,7 @@
             <p:nvPr/>
           </p:nvPicPr>
           <p:blipFill>
-            <a:blip r:embed="rId34">
+            <a:blip r:embed="rId33">
               <a:extLst>
                 <a:ext uri="{28A0092B-C50C-407E-A947-70E740481C1C}">
                   <a14:useLocalDpi xmlns:a14="http://schemas.microsoft.com/office/drawing/2010/main" val="0"/>
@@ -10872,7 +10860,7 @@
             <p:nvPr/>
           </p:nvPicPr>
           <p:blipFill>
-            <a:blip r:embed="rId35">
+            <a:blip r:embed="rId34">
               <a:extLst>
                 <a:ext uri="{28A0092B-C50C-407E-A947-70E740481C1C}">
                   <a14:useLocalDpi xmlns:a14="http://schemas.microsoft.com/office/drawing/2010/main" val="0"/>
@@ -11012,7 +11000,7 @@
             <p:nvPr/>
           </p:nvPicPr>
           <p:blipFill rotWithShape="1">
-            <a:blip r:embed="rId36"/>
+            <a:blip r:embed="rId35"/>
             <a:srcRect r="15520"/>
             <a:stretch/>
           </p:blipFill>
@@ -11041,7 +11029,7 @@
             <p:nvPr/>
           </p:nvPicPr>
           <p:blipFill rotWithShape="1">
-            <a:blip r:embed="rId37"/>
+            <a:blip r:embed="rId36"/>
             <a:srcRect l="1529" r="16203"/>
             <a:stretch/>
           </p:blipFill>
@@ -11070,7 +11058,7 @@
             <p:nvPr/>
           </p:nvPicPr>
           <p:blipFill rotWithShape="1">
-            <a:blip r:embed="rId38"/>
+            <a:blip r:embed="rId37"/>
             <a:srcRect r="17439"/>
             <a:stretch/>
           </p:blipFill>
@@ -11139,7 +11127,7 @@
           <p:nvPr/>
         </p:nvPicPr>
         <p:blipFill>
-          <a:blip r:embed="rId39"/>
+          <a:blip r:embed="rId38"/>
           <a:stretch>
             <a:fillRect/>
           </a:stretch>
@@ -11208,7 +11196,7 @@
           <p:nvPr/>
         </p:nvPicPr>
         <p:blipFill rotWithShape="1">
-          <a:blip r:embed="rId40"/>
+          <a:blip r:embed="rId39"/>
           <a:srcRect r="17331"/>
           <a:stretch/>
         </p:blipFill>
@@ -11297,7 +11285,7 @@
             <p:nvPr/>
           </p:nvPicPr>
           <p:blipFill>
-            <a:blip r:embed="rId41"/>
+            <a:blip r:embed="rId40"/>
             <a:stretch>
               <a:fillRect/>
             </a:stretch>
@@ -11327,7 +11315,7 @@
             <p:nvPr/>
           </p:nvPicPr>
           <p:blipFill>
-            <a:blip r:embed="rId42"/>
+            <a:blip r:embed="rId41"/>
             <a:stretch>
               <a:fillRect/>
             </a:stretch>
@@ -11357,7 +11345,7 @@
             <p:nvPr/>
           </p:nvPicPr>
           <p:blipFill rotWithShape="1">
-            <a:blip r:embed="rId43">
+            <a:blip r:embed="rId42">
               <a:extLst>
                 <a:ext uri="{28A0092B-C50C-407E-A947-70E740481C1C}">
                   <a14:useLocalDpi xmlns:a14="http://schemas.microsoft.com/office/drawing/2010/main" val="0"/>
@@ -11477,6 +11465,53 @@
           <p:nvPr/>
         </p:nvPicPr>
         <p:blipFill>
+          <a:blip r:embed="rId43">
+            <a:extLst>
+              <a:ext uri="{28A0092B-C50C-407E-A947-70E740481C1C}">
+                <a14:useLocalDpi xmlns:a14="http://schemas.microsoft.com/office/drawing/2010/main" val="0"/>
+              </a:ext>
+            </a:extLst>
+          </a:blip>
+          <a:srcRect/>
+          <a:stretch>
+            <a:fillRect/>
+          </a:stretch>
+        </p:blipFill>
+        <p:spPr bwMode="auto">
+          <a:xfrm>
+            <a:off x="26304081" y="2032951"/>
+            <a:ext cx="3936808" cy="1823086"/>
+          </a:xfrm>
+          <a:prstGeom prst="rect">
+            <a:avLst/>
+          </a:prstGeom>
+          <a:noFill/>
+          <a:extLst>
+            <a:ext uri="{909E8E84-426E-40DD-AFC4-6F175D3DCCD1}">
+              <a14:hiddenFill xmlns:a14="http://schemas.microsoft.com/office/drawing/2010/main">
+                <a:solidFill>
+                  <a:srgbClr val="FFFFFF"/>
+                </a:solidFill>
+              </a14:hiddenFill>
+            </a:ext>
+          </a:extLst>
+        </p:spPr>
+      </p:pic>
+      <p:pic>
+        <p:nvPicPr>
+          <p:cNvPr id="1026" name="Picture 2">
+            <a:extLst>
+              <a:ext uri="{FF2B5EF4-FFF2-40B4-BE49-F238E27FC236}">
+                <a16:creationId xmlns:a16="http://schemas.microsoft.com/office/drawing/2014/main" id="{360766C2-B4F6-410E-496F-E09D572053F1}"/>
+              </a:ext>
+            </a:extLst>
+          </p:cNvPr>
+          <p:cNvPicPr>
+            <a:picLocks noChangeAspect="1" noChangeArrowheads="1"/>
+          </p:cNvPicPr>
+          <p:nvPr/>
+        </p:nvPicPr>
+        <p:blipFill>
           <a:blip r:embed="rId44">
             <a:extLst>
               <a:ext uri="{28A0092B-C50C-407E-A947-70E740481C1C}">
@@ -11491,8 +11526,8 @@
         </p:blipFill>
         <p:spPr bwMode="auto">
           <a:xfrm>
-            <a:off x="27064457" y="2205527"/>
-            <a:ext cx="3456420" cy="1600624"/>
+            <a:off x="25909269" y="335211"/>
+            <a:ext cx="4904424" cy="1692026"/>
           </a:xfrm>
           <a:prstGeom prst="rect">
             <a:avLst/>

</xml_diff>